<commit_message>
fixed mistakes in Kepler slides
</commit_message>
<xml_diff>
--- a/lectures/04-18-Modern-GPUs.pptx
+++ b/lectures/04-18-Modern-GPUs.pptx
@@ -336,11 +336,11 @@
         </c:dLbls>
         <c:marker val="1"/>
         <c:smooth val="0"/>
-        <c:axId val="427050984"/>
-        <c:axId val="388368264"/>
+        <c:axId val="442042136"/>
+        <c:axId val="442047944"/>
       </c:lineChart>
       <c:catAx>
-        <c:axId val="427050984"/>
+        <c:axId val="442042136"/>
         <c:scaling>
           <c:orientation val="minMax"/>
         </c:scaling>
@@ -384,7 +384,7 @@
             <a:endParaRPr lang="en-US"/>
           </a:p>
         </c:txPr>
-        <c:crossAx val="388368264"/>
+        <c:crossAx val="442047944"/>
         <c:crosses val="autoZero"/>
         <c:auto val="1"/>
         <c:lblAlgn val="ctr"/>
@@ -392,7 +392,7 @@
         <c:noMultiLvlLbl val="0"/>
       </c:catAx>
       <c:valAx>
-        <c:axId val="388368264"/>
+        <c:axId val="442047944"/>
         <c:scaling>
           <c:orientation val="minMax"/>
         </c:scaling>
@@ -436,7 +436,7 @@
             <a:endParaRPr lang="en-US"/>
           </a:p>
         </c:txPr>
-        <c:crossAx val="427050984"/>
+        <c:crossAx val="442042136"/>
         <c:crosses val="autoZero"/>
         <c:crossBetween val="between"/>
       </c:valAx>
@@ -654,11 +654,11 @@
         </c:dLbls>
         <c:marker val="1"/>
         <c:smooth val="0"/>
-        <c:axId val="493221976"/>
-        <c:axId val="388496312"/>
+        <c:axId val="442125848"/>
+        <c:axId val="442131608"/>
       </c:lineChart>
       <c:catAx>
-        <c:axId val="493221976"/>
+        <c:axId val="442125848"/>
         <c:scaling>
           <c:orientation val="minMax"/>
         </c:scaling>
@@ -702,7 +702,7 @@
             <a:endParaRPr lang="en-US"/>
           </a:p>
         </c:txPr>
-        <c:crossAx val="388496312"/>
+        <c:crossAx val="442131608"/>
         <c:crosses val="autoZero"/>
         <c:auto val="1"/>
         <c:lblAlgn val="ctr"/>
@@ -710,7 +710,7 @@
         <c:noMultiLvlLbl val="0"/>
       </c:catAx>
       <c:valAx>
-        <c:axId val="388496312"/>
+        <c:axId val="442131608"/>
         <c:scaling>
           <c:orientation val="minMax"/>
         </c:scaling>
@@ -750,7 +750,7 @@
             <a:endParaRPr lang="en-US"/>
           </a:p>
         </c:txPr>
-        <c:crossAx val="493221976"/>
+        <c:crossAx val="442125848"/>
         <c:crosses val="autoZero"/>
         <c:crossBetween val="between"/>
       </c:valAx>
@@ -865,7 +865,7 @@
           <a:p>
             <a:fld id="{7E3B3924-D1DB-1842-B5D0-CEB89ACFC6AD}" type="datetimeFigureOut">
               <a:rPr lang="en-US" smtClean="0"/>
-              <a:t>4/18/12</a:t>
+              <a:t>4/22/12</a:t>
             </a:fld>
             <a:endParaRPr lang="en-US"/>
           </a:p>
@@ -1030,7 +1030,7 @@
           <a:p>
             <a:fld id="{287DD73C-E11E-0D40-A69E-0A1B91985344}" type="datetimeFigureOut">
               <a:rPr lang="en-US" smtClean="0"/>
-              <a:t>4/15/12</a:t>
+              <a:t>4/22/12</a:t>
             </a:fld>
             <a:endParaRPr lang="en-US"/>
           </a:p>
@@ -2325,7 +2325,7 @@
           <a:p>
             <a:fld id="{E0CDCF18-2578-EB4E-BB13-AA0CAEBE4477}" type="datetimeFigureOut">
               <a:rPr lang="en-US" smtClean="0"/>
-              <a:t>4/15/12</a:t>
+              <a:t>4/22/12</a:t>
             </a:fld>
             <a:endParaRPr lang="en-US"/>
           </a:p>
@@ -2536,7 +2536,7 @@
           <a:p>
             <a:fld id="{E0CDCF18-2578-EB4E-BB13-AA0CAEBE4477}" type="datetimeFigureOut">
               <a:rPr lang="en-US" smtClean="0"/>
-              <a:t>4/15/12</a:t>
+              <a:t>4/22/12</a:t>
             </a:fld>
             <a:endParaRPr lang="en-US"/>
           </a:p>
@@ -2716,7 +2716,7 @@
           <a:p>
             <a:fld id="{E0CDCF18-2578-EB4E-BB13-AA0CAEBE4477}" type="datetimeFigureOut">
               <a:rPr lang="en-US" smtClean="0"/>
-              <a:t>4/15/12</a:t>
+              <a:t>4/22/12</a:t>
             </a:fld>
             <a:endParaRPr lang="en-US"/>
           </a:p>
@@ -2886,7 +2886,7 @@
           <a:p>
             <a:fld id="{E0CDCF18-2578-EB4E-BB13-AA0CAEBE4477}" type="datetimeFigureOut">
               <a:rPr lang="en-US" smtClean="0"/>
-              <a:t>4/15/12</a:t>
+              <a:t>4/22/12</a:t>
             </a:fld>
             <a:endParaRPr lang="en-US"/>
           </a:p>
@@ -3132,7 +3132,7 @@
           <a:p>
             <a:fld id="{E0CDCF18-2578-EB4E-BB13-AA0CAEBE4477}" type="datetimeFigureOut">
               <a:rPr lang="en-US" smtClean="0"/>
-              <a:t>4/15/12</a:t>
+              <a:t>4/22/12</a:t>
             </a:fld>
             <a:endParaRPr lang="en-US"/>
           </a:p>
@@ -3420,7 +3420,7 @@
           <a:p>
             <a:fld id="{E0CDCF18-2578-EB4E-BB13-AA0CAEBE4477}" type="datetimeFigureOut">
               <a:rPr lang="en-US" smtClean="0"/>
-              <a:t>4/15/12</a:t>
+              <a:t>4/22/12</a:t>
             </a:fld>
             <a:endParaRPr lang="en-US"/>
           </a:p>
@@ -3842,7 +3842,7 @@
           <a:p>
             <a:fld id="{E0CDCF18-2578-EB4E-BB13-AA0CAEBE4477}" type="datetimeFigureOut">
               <a:rPr lang="en-US" smtClean="0"/>
-              <a:t>4/15/12</a:t>
+              <a:t>4/22/12</a:t>
             </a:fld>
             <a:endParaRPr lang="en-US"/>
           </a:p>
@@ -3960,7 +3960,7 @@
           <a:p>
             <a:fld id="{E0CDCF18-2578-EB4E-BB13-AA0CAEBE4477}" type="datetimeFigureOut">
               <a:rPr lang="en-US" smtClean="0"/>
-              <a:t>4/15/12</a:t>
+              <a:t>4/22/12</a:t>
             </a:fld>
             <a:endParaRPr lang="en-US"/>
           </a:p>
@@ -4055,7 +4055,7 @@
           <a:p>
             <a:fld id="{E0CDCF18-2578-EB4E-BB13-AA0CAEBE4477}" type="datetimeFigureOut">
               <a:rPr lang="en-US" smtClean="0"/>
-              <a:t>4/15/12</a:t>
+              <a:t>4/22/12</a:t>
             </a:fld>
             <a:endParaRPr lang="en-US"/>
           </a:p>
@@ -4332,7 +4332,7 @@
           <a:p>
             <a:fld id="{E0CDCF18-2578-EB4E-BB13-AA0CAEBE4477}" type="datetimeFigureOut">
               <a:rPr lang="en-US" smtClean="0"/>
-              <a:t>4/15/12</a:t>
+              <a:t>4/22/12</a:t>
             </a:fld>
             <a:endParaRPr lang="en-US"/>
           </a:p>
@@ -4585,7 +4585,7 @@
           <a:p>
             <a:fld id="{E0CDCF18-2578-EB4E-BB13-AA0CAEBE4477}" type="datetimeFigureOut">
               <a:rPr lang="en-US" smtClean="0"/>
-              <a:t>4/15/12</a:t>
+              <a:t>4/22/12</a:t>
             </a:fld>
             <a:endParaRPr lang="en-US"/>
           </a:p>
@@ -4798,7 +4798,7 @@
           <a:p>
             <a:fld id="{E0CDCF18-2578-EB4E-BB13-AA0CAEBE4477}" type="datetimeFigureOut">
               <a:rPr lang="en-US" smtClean="0"/>
-              <a:t>4/15/12</a:t>
+              <a:t>4/22/12</a:t>
             </a:fld>
             <a:endParaRPr lang="en-US"/>
           </a:p>
@@ -6229,7 +6229,6 @@
               <a:rPr lang="en-US" dirty="0" smtClean="0"/>
               <a:t>ATI Radeon HD 5870</a:t>
             </a:r>
-            <a:endParaRPr lang="en-US" dirty="0" smtClean="0"/>
           </a:p>
         </p:txBody>
       </p:sp>
@@ -6278,7 +6277,6 @@
               <a:rPr lang="en-US" dirty="0" smtClean="0"/>
               <a:t>2.15 billion transistors</a:t>
             </a:r>
-            <a:endParaRPr lang="en-US" dirty="0" smtClean="0"/>
           </a:p>
         </p:txBody>
       </p:sp>
@@ -8247,7 +8245,7 @@
             </a:r>
             <a:r>
               <a:rPr lang="en-US" dirty="0" smtClean="0"/>
-              <a:t> Extended SM (SMX)</a:t>
+              <a:t> SMX</a:t>
             </a:r>
             <a:endParaRPr lang="en-US" dirty="0"/>
           </a:p>
@@ -8265,13 +8263,13 @@
         </p:nvSpPr>
         <p:spPr>
           <a:xfrm>
-            <a:off x="457200" y="1600200"/>
-            <a:ext cx="4668316" cy="4988470"/>
+            <a:off x="457200" y="1310230"/>
+            <a:ext cx="4668316" cy="5363839"/>
           </a:xfrm>
         </p:spPr>
         <p:txBody>
           <a:bodyPr>
-            <a:normAutofit fontScale="92500" lnSpcReduction="10000"/>
+            <a:normAutofit fontScale="92500" lnSpcReduction="20000"/>
           </a:bodyPr>
           <a:lstStyle/>
           <a:p>
@@ -8292,61 +8290,94 @@
             <a:pPr lvl="1"/>
             <a:r>
               <a:rPr lang="en-US" dirty="0" smtClean="0"/>
-              <a:t>Need 32 SPs per clock</a:t>
-            </a:r>
-          </a:p>
-          <a:p>
-            <a:r>
-              <a:rPr lang="en-US" dirty="0" smtClean="0"/>
-              <a:t>Kepler then doubles resources again of GF104 SM</a:t>
+              <a:t>Need 32 SPs per </a:t>
+            </a:r>
+            <a:r>
+              <a:rPr lang="en-US" dirty="0" smtClean="0"/>
+              <a:t>clock</a:t>
             </a:r>
           </a:p>
           <a:p>
             <a:pPr lvl="1"/>
             <a:r>
               <a:rPr lang="en-US" dirty="0" smtClean="0"/>
-              <a:t>96 SPs, 32 LD/ST, 32 SFUs</a:t>
-            </a:r>
+              <a:t>Ideally 8 instructions issued every cycle (2 for each of 4 warps)</a:t>
+            </a:r>
+            <a:endParaRPr lang="en-US" dirty="0" smtClean="0"/>
+          </a:p>
+          <a:p>
+            <a:r>
+              <a:rPr lang="en-US" dirty="0" smtClean="0"/>
+              <a:t>Kepler SMX has 6x SP count</a:t>
+            </a:r>
+            <a:endParaRPr lang="en-US" dirty="0" smtClean="0"/>
           </a:p>
           <a:p>
             <a:pPr lvl="1"/>
             <a:r>
               <a:rPr lang="en-US" dirty="0" smtClean="0"/>
-              <a:t>New FP64 block</a:t>
-            </a:r>
-          </a:p>
-          <a:p>
-            <a:r>
-              <a:rPr lang="en-US" dirty="0" smtClean="0"/>
-              <a:t>Note: from Fermi, register file size has only doubled and shared memory/L1 size is the same</a:t>
-            </a:r>
-          </a:p>
-        </p:txBody>
-      </p:sp>
-      <p:pic>
-        <p:nvPicPr>
-          <p:cNvPr id="13" name="Content Placeholder 12"/>
-          <p:cNvPicPr>
-            <a:picLocks noGrp="1" noChangeAspect="1"/>
-          </p:cNvPicPr>
-          <p:nvPr>
-            <p:ph sz="half" idx="2"/>
-          </p:nvPr>
-        </p:nvPicPr>
-        <p:blipFill>
-          <a:blip r:embed="rId3"/>
-          <a:srcRect l="-26000" r="-26000"/>
-          <a:stretch>
-            <a:fillRect/>
-          </a:stretch>
-        </p:blipFill>
-        <p:spPr>
-          <a:xfrm>
-            <a:off x="4481961" y="1271333"/>
-            <a:ext cx="4899774" cy="5491060"/>
-          </a:xfrm>
-        </p:spPr>
-      </p:pic>
+              <a:t>192 </a:t>
+            </a:r>
+            <a:r>
+              <a:rPr lang="en-US" dirty="0" smtClean="0"/>
+              <a:t>SPs, 32 LD/ST, 32 SFUs</a:t>
+            </a:r>
+          </a:p>
+          <a:p>
+            <a:pPr lvl="1"/>
+            <a:r>
+              <a:rPr lang="en-US" dirty="0" smtClean="0"/>
+              <a:t>New FP64 </a:t>
+            </a:r>
+            <a:r>
+              <a:rPr lang="en-US" dirty="0" smtClean="0"/>
+              <a:t>block</a:t>
+            </a:r>
+          </a:p>
+          <a:p>
+            <a:r>
+              <a:rPr lang="en-US" dirty="0" smtClean="0"/>
+              <a:t>Memory (compared to Fermi)</a:t>
+            </a:r>
+            <a:endParaRPr lang="en-US" dirty="0" smtClean="0"/>
+          </a:p>
+          <a:p>
+            <a:pPr lvl="1"/>
+            <a:r>
+              <a:rPr lang="en-US" dirty="0" smtClean="0"/>
+              <a:t>register </a:t>
+            </a:r>
+            <a:r>
+              <a:rPr lang="en-US" dirty="0" smtClean="0"/>
+              <a:t>file size has only doubled </a:t>
+            </a:r>
+            <a:endParaRPr lang="en-US" dirty="0" smtClean="0"/>
+          </a:p>
+          <a:p>
+            <a:pPr lvl="1"/>
+            <a:r>
+              <a:rPr lang="en-US" dirty="0" smtClean="0"/>
+              <a:t>shared </a:t>
+            </a:r>
+            <a:r>
+              <a:rPr lang="en-US" dirty="0" smtClean="0"/>
+              <a:t>memory/L1 size is the </a:t>
+            </a:r>
+            <a:r>
+              <a:rPr lang="en-US" dirty="0" smtClean="0"/>
+              <a:t>same</a:t>
+            </a:r>
+          </a:p>
+          <a:p>
+            <a:pPr lvl="1"/>
+            <a:r>
+              <a:rPr lang="en-US" dirty="0" smtClean="0"/>
+              <a:t>L2 decreases</a:t>
+            </a:r>
+            <a:endParaRPr lang="en-US" dirty="0" smtClean="0"/>
+          </a:p>
+        </p:txBody>
+      </p:sp>
       <p:sp>
         <p:nvSpPr>
           <p:cNvPr id="14" name="TextBox 13"/>
@@ -8374,15 +8405,45 @@
               <a:t>Image from </a:t>
             </a:r>
             <a:r>
-              <a:rPr lang="en-US" sz="1200" dirty="0" err="1" smtClean="0">
-                <a:hlinkClick r:id="rId4"/>
+              <a:rPr lang="en-US" sz="1200" dirty="0" smtClean="0">
+                <a:hlinkClick r:id="rId3"/>
               </a:rPr>
-              <a:t>AnandTech</a:t>
+              <a:t>NVIDIA</a:t>
             </a:r>
             <a:endParaRPr lang="en-US" sz="1200" dirty="0"/>
           </a:p>
         </p:txBody>
       </p:sp>
+      <p:pic>
+        <p:nvPicPr>
+          <p:cNvPr id="3" name="Content Placeholder 2" descr="Screen shot 2012-04-22 at 12.54.22 PM.png"/>
+          <p:cNvPicPr>
+            <a:picLocks noGrp="1" noChangeAspect="1"/>
+          </p:cNvPicPr>
+          <p:nvPr>
+            <p:ph sz="half" idx="2"/>
+          </p:nvPr>
+        </p:nvPicPr>
+        <p:blipFill>
+          <a:blip r:embed="rId4">
+            <a:extLst>
+              <a:ext uri="{28A0092B-C50C-407E-A947-70E740481C1C}">
+                <a14:useLocalDpi xmlns:a14="http://schemas.microsoft.com/office/drawing/2010/main" val="0"/>
+              </a:ext>
+            </a:extLst>
+          </a:blip>
+          <a:srcRect l="-23138" r="-23138"/>
+          <a:stretch>
+            <a:fillRect/>
+          </a:stretch>
+        </p:blipFill>
+        <p:spPr>
+          <a:xfrm>
+            <a:off x="4510690" y="1181076"/>
+            <a:ext cx="5001172" cy="5604694"/>
+          </a:xfrm>
+        </p:spPr>
+      </p:pic>
     </p:spTree>
     <p:extLst>
       <p:ext uri="{BB962C8B-B14F-4D97-AF65-F5344CB8AC3E}">
@@ -8471,7 +8532,6 @@
               <a:rPr lang="en-US" dirty="0" smtClean="0"/>
               <a:t>Control flow advancements</a:t>
             </a:r>
-            <a:endParaRPr lang="en-US" dirty="0" smtClean="0"/>
           </a:p>
           <a:p>
             <a:pPr lvl="1"/>
@@ -8993,7 +9053,7 @@
         <p:spPr/>
         <p:txBody>
           <a:bodyPr>
-            <a:normAutofit fontScale="92500"/>
+            <a:normAutofit fontScale="92500" lnSpcReduction="20000"/>
           </a:bodyPr>
           <a:lstStyle/>
           <a:p>
@@ -9012,30 +9072,26 @@
           <a:p>
             <a:r>
               <a:rPr lang="en-US" dirty="0" smtClean="0"/>
-              <a:t>Schroeder, Tim C. “Peer-to-Peer &amp; Unified Virtual Addressing” CUDA Webinar. </a:t>
+              <a:t>NVIDIA GeForce GTX 680 Whitepaper. </a:t>
             </a:r>
             <a:r>
               <a:rPr lang="en-US" dirty="0" smtClean="0">
                 <a:hlinkClick r:id="rId3"/>
               </a:rPr>
-              <a:t>Slides</a:t>
+              <a:t>Link</a:t>
             </a:r>
             <a:endParaRPr lang="en-US" dirty="0" smtClean="0"/>
           </a:p>
           <a:p>
             <a:r>
-              <a:rPr lang="en-US" dirty="0" err="1" smtClean="0"/>
-              <a:t>AnandTech</a:t>
-            </a:r>
-            <a:r>
-              <a:rPr lang="en-US" dirty="0" smtClean="0"/>
-              <a:t> Review of the GTX 460. </a:t>
+              <a:rPr lang="en-US" dirty="0" smtClean="0"/>
+              <a:t>Schroeder, Tim C. “Peer-to-Peer &amp; Unified Virtual Addressing” CUDA Webinar. </a:t>
             </a:r>
             <a:r>
               <a:rPr lang="en-US" dirty="0" smtClean="0">
                 <a:hlinkClick r:id="rId4"/>
               </a:rPr>
-              <a:t>Link</a:t>
+              <a:t>Slides</a:t>
             </a:r>
             <a:endParaRPr lang="en-US" dirty="0" smtClean="0"/>
           </a:p>
@@ -9046,7 +9102,7 @@
             </a:r>
             <a:r>
               <a:rPr lang="en-US" dirty="0" smtClean="0"/>
-              <a:t> Review of the Radeon HD 5870. </a:t>
+              <a:t> Review of the GTX 460. </a:t>
             </a:r>
             <a:r>
               <a:rPr lang="en-US" dirty="0" smtClean="0">
@@ -9063,7 +9119,7 @@
             </a:r>
             <a:r>
               <a:rPr lang="en-US" dirty="0" smtClean="0"/>
-              <a:t> Review of the GTX 680. </a:t>
+              <a:t> Review of the Radeon HD 5870. </a:t>
             </a:r>
             <a:r>
               <a:rPr lang="en-US" dirty="0" smtClean="0">
@@ -9075,6 +9131,23 @@
           </a:p>
           <a:p>
             <a:r>
+              <a:rPr lang="en-US" dirty="0" err="1" smtClean="0"/>
+              <a:t>AnandTech</a:t>
+            </a:r>
+            <a:r>
+              <a:rPr lang="en-US" dirty="0" smtClean="0"/>
+              <a:t> Review of the GTX 680. </a:t>
+            </a:r>
+            <a:r>
+              <a:rPr lang="en-US" dirty="0" smtClean="0">
+                <a:hlinkClick r:id="rId7"/>
+              </a:rPr>
+              <a:t>Link</a:t>
+            </a:r>
+            <a:endParaRPr lang="en-US" dirty="0" smtClean="0"/>
+          </a:p>
+          <a:p>
+            <a:r>
               <a:rPr lang="en-US" dirty="0" smtClean="0"/>
               <a:t>AMD </a:t>
             </a:r>
@@ -9088,7 +9161,20 @@
             </a:r>
             <a:r>
               <a:rPr lang="en-US" dirty="0" smtClean="0">
-                <a:hlinkClick r:id="rId7"/>
+                <a:hlinkClick r:id="rId8"/>
+              </a:rPr>
+              <a:t>Link</a:t>
+            </a:r>
+            <a:endParaRPr lang="en-US" dirty="0" smtClean="0"/>
+          </a:p>
+          <a:p>
+            <a:r>
+              <a:rPr lang="en-US" dirty="0" smtClean="0"/>
+              <a:t>NVIDIA CUDA Programming Guide (v 4.2). </a:t>
+            </a:r>
+            <a:r>
+              <a:rPr lang="en-US" dirty="0" smtClean="0">
+                <a:hlinkClick r:id="rId9"/>
               </a:rPr>
               <a:t>Link</a:t>
             </a:r>

</xml_diff>